<commit_message>
feat: finish the probability and half of the Experimentation
</commit_message>
<xml_diff>
--- a/analyze-a_b-test-results.pptx
+++ b/analyze-a_b-test-results.pptx
@@ -18,16 +18,16 @@
   <p:notesSz cx="6858000" cy="9144000"/>
   <p:embeddedFontLst>
     <p:embeddedFont>
-      <p:font typeface="Cairo" pitchFamily="2" charset="-78"/>
+      <p:font typeface="Open Sans" panose="020B0604020202020204" charset="0"/>
       <p:regular r:id="rId8"/>
       <p:bold r:id="rId9"/>
+      <p:italic r:id="rId10"/>
+      <p:boldItalic r:id="rId11"/>
     </p:embeddedFont>
     <p:embeddedFont>
-      <p:font typeface="Open Sans" panose="020B0604020202020204" charset="0"/>
-      <p:regular r:id="rId10"/>
-      <p:bold r:id="rId11"/>
-      <p:italic r:id="rId12"/>
-      <p:boldItalic r:id="rId13"/>
+      <p:font typeface="Cairo" pitchFamily="2" charset="-78"/>
+      <p:regular r:id="rId12"/>
+      <p:bold r:id="rId13"/>
     </p:embeddedFont>
     <p:embeddedFont>
       <p:font typeface="Cambria" panose="02040503050406030204" pitchFamily="18" charset="0"/>
@@ -8137,7 +8137,7 @@
         <p:spPr>
           <a:xfrm>
             <a:off x="118100" y="1020700"/>
-            <a:ext cx="9076500" cy="1581941"/>
+            <a:ext cx="9076500" cy="1227998"/>
           </a:xfrm>
           <a:prstGeom prst="rect">
             <a:avLst/>
@@ -8295,7 +8295,7 @@
               <a:buNone/>
             </a:pPr>
             <a:r>
-              <a:rPr lang="en" sz="2000" dirty="0">
+              <a:rPr lang="en" sz="2000" dirty="0" smtClean="0">
                 <a:solidFill>
                   <a:schemeClr val="dk1"/>
                 </a:solidFill>
@@ -8308,47 +8308,6 @@
                 <a:sym typeface="Cambria"/>
               </a:rPr>
               <a:t>​</a:t>
-            </a:r>
-            <a:endParaRPr sz="2000" dirty="0">
-              <a:solidFill>
-                <a:schemeClr val="dk1"/>
-              </a:solidFill>
-              <a:highlight>
-                <a:schemeClr val="lt1"/>
-              </a:highlight>
-              <a:latin typeface="Cairo" pitchFamily="2" charset="-78"/>
-              <a:ea typeface="Cambria"/>
-              <a:cs typeface="Cairo" pitchFamily="2" charset="-78"/>
-              <a:sym typeface="Cambria"/>
-            </a:endParaRPr>
-          </a:p>
-          <a:p>
-            <a:pPr marL="0" lvl="0" indent="0" algn="l" rtl="0">
-              <a:lnSpc>
-                <a:spcPct val="115000"/>
-              </a:lnSpc>
-              <a:spcBef>
-                <a:spcPts val="0"/>
-              </a:spcBef>
-              <a:spcAft>
-                <a:spcPts val="0"/>
-              </a:spcAft>
-              <a:buNone/>
-            </a:pPr>
-            <a:r>
-              <a:rPr lang="en" sz="2000" b="1" dirty="0">
-                <a:solidFill>
-                  <a:srgbClr val="FF0000"/>
-                </a:solidFill>
-                <a:highlight>
-                  <a:schemeClr val="lt1"/>
-                </a:highlight>
-                <a:latin typeface="Cairo" pitchFamily="2" charset="-78"/>
-                <a:ea typeface="Cambria"/>
-                <a:cs typeface="Cairo" pitchFamily="2" charset="-78"/>
-                <a:sym typeface="Cambria"/>
-              </a:rPr>
-              <a:t>[Update the Below Chart With Your Chart of Where Users Are From]</a:t>
             </a:r>
             <a:endParaRPr sz="2000" dirty="0">
               <a:solidFill>
@@ -8425,34 +8384,6 @@
           </a:p>
         </p:txBody>
       </p:sp>
-      <p:pic>
-        <p:nvPicPr>
-          <p:cNvPr id="79" name="Google Shape;79;p17"/>
-          <p:cNvPicPr preferRelativeResize="0"/>
-          <p:nvPr/>
-        </p:nvPicPr>
-        <p:blipFill>
-          <a:blip r:embed="rId3">
-            <a:alphaModFix/>
-          </a:blip>
-          <a:stretch>
-            <a:fillRect/>
-          </a:stretch>
-        </p:blipFill>
-        <p:spPr>
-          <a:xfrm>
-            <a:off x="1900475" y="2556100"/>
-            <a:ext cx="5725150" cy="2470700"/>
-          </a:xfrm>
-          <a:prstGeom prst="rect">
-            <a:avLst/>
-          </a:prstGeom>
-          <a:noFill/>
-          <a:ln>
-            <a:noFill/>
-          </a:ln>
-        </p:spPr>
-      </p:pic>
     </p:spTree>
   </p:cSld>
   <p:clrMapOvr>
@@ -8565,28 +8496,28 @@
                 <a:gridCol w="1809750">
                   <a:extLst>
                     <a:ext uri="{9D8B030D-6E8A-4147-A177-3AD203B41FA5}">
-                      <a16:colId xmlns:a16="http://schemas.microsoft.com/office/drawing/2014/main" xmlns="" val="20000"/>
+                      <a16:colId xmlns="" xmlns:a16="http://schemas.microsoft.com/office/drawing/2014/main" val="20000"/>
                     </a:ext>
                   </a:extLst>
                 </a:gridCol>
                 <a:gridCol w="1809750">
                   <a:extLst>
                     <a:ext uri="{9D8B030D-6E8A-4147-A177-3AD203B41FA5}">
-                      <a16:colId xmlns:a16="http://schemas.microsoft.com/office/drawing/2014/main" xmlns="" val="20001"/>
+                      <a16:colId xmlns="" xmlns:a16="http://schemas.microsoft.com/office/drawing/2014/main" val="20001"/>
                     </a:ext>
                   </a:extLst>
                 </a:gridCol>
                 <a:gridCol w="1809750">
                   <a:extLst>
                     <a:ext uri="{9D8B030D-6E8A-4147-A177-3AD203B41FA5}">
-                      <a16:colId xmlns:a16="http://schemas.microsoft.com/office/drawing/2014/main" xmlns="" val="20002"/>
+                      <a16:colId xmlns="" xmlns:a16="http://schemas.microsoft.com/office/drawing/2014/main" val="20002"/>
                     </a:ext>
                   </a:extLst>
                 </a:gridCol>
                 <a:gridCol w="1809750">
                   <a:extLst>
                     <a:ext uri="{9D8B030D-6E8A-4147-A177-3AD203B41FA5}">
-                      <a16:colId xmlns:a16="http://schemas.microsoft.com/office/drawing/2014/main" xmlns="" val="20003"/>
+                      <a16:colId xmlns="" xmlns:a16="http://schemas.microsoft.com/office/drawing/2014/main" val="20003"/>
                     </a:ext>
                   </a:extLst>
                 </a:gridCol>
@@ -8698,7 +8629,7 @@
                 </a:tc>
                 <a:extLst>
                   <a:ext uri="{0D108BD9-81ED-4DB2-BD59-A6C34878D82A}">
-                    <a16:rowId xmlns:a16="http://schemas.microsoft.com/office/drawing/2014/main" xmlns="" val="10000"/>
+                    <a16:rowId xmlns="" xmlns:a16="http://schemas.microsoft.com/office/drawing/2014/main" val="10000"/>
                   </a:ext>
                 </a:extLst>
               </a:tr>
@@ -8839,7 +8770,7 @@
                 </a:tc>
                 <a:extLst>
                   <a:ext uri="{0D108BD9-81ED-4DB2-BD59-A6C34878D82A}">
-                    <a16:rowId xmlns:a16="http://schemas.microsoft.com/office/drawing/2014/main" xmlns="" val="10001"/>
+                    <a16:rowId xmlns="" xmlns:a16="http://schemas.microsoft.com/office/drawing/2014/main" val="10001"/>
                   </a:ext>
                 </a:extLst>
               </a:tr>
@@ -8981,7 +8912,7 @@
                 </a:tc>
                 <a:extLst>
                   <a:ext uri="{0D108BD9-81ED-4DB2-BD59-A6C34878D82A}">
-                    <a16:rowId xmlns:a16="http://schemas.microsoft.com/office/drawing/2014/main" xmlns="" val="10002"/>
+                    <a16:rowId xmlns="" xmlns:a16="http://schemas.microsoft.com/office/drawing/2014/main" val="10002"/>
                   </a:ext>
                 </a:extLst>
               </a:tr>
@@ -9187,7 +9118,7 @@
         <p:spPr>
           <a:xfrm>
             <a:off x="118100" y="1020700"/>
-            <a:ext cx="9076500" cy="2234428"/>
+            <a:ext cx="9076500" cy="2569904"/>
           </a:xfrm>
           <a:prstGeom prst="rect">
             <a:avLst/>
@@ -9486,8 +9417,34 @@
               </a:spcAft>
               <a:buNone/>
             </a:pPr>
+            <a:endParaRPr lang="en" sz="2000" b="1" dirty="0">
+              <a:solidFill>
+                <a:srgbClr val="404040"/>
+              </a:solidFill>
+              <a:highlight>
+                <a:schemeClr val="lt1"/>
+              </a:highlight>
+              <a:latin typeface="Cairo" pitchFamily="2" charset="-78"/>
+              <a:ea typeface="Cambria"/>
+              <a:cs typeface="Cairo" pitchFamily="2" charset="-78"/>
+              <a:sym typeface="Cambria"/>
+            </a:endParaRPr>
+          </a:p>
+          <a:p>
+            <a:pPr marL="0" lvl="0" indent="0" algn="l" rtl="0">
+              <a:lnSpc>
+                <a:spcPct val="108750"/>
+              </a:lnSpc>
+              <a:spcBef>
+                <a:spcPts val="0"/>
+              </a:spcBef>
+              <a:spcAft>
+                <a:spcPts val="0"/>
+              </a:spcAft>
+              <a:buNone/>
+            </a:pPr>
             <a:r>
-              <a:rPr lang="en" sz="2000" b="1" dirty="0">
+              <a:rPr lang="en" sz="2000" b="1" dirty="0" smtClean="0">
                 <a:solidFill>
                   <a:srgbClr val="404040"/>
                 </a:solidFill>
@@ -9499,7 +9456,22 @@
                 <a:cs typeface="Cairo" pitchFamily="2" charset="-78"/>
                 <a:sym typeface="Cambria"/>
               </a:rPr>
-              <a:t>Conclusion:</a:t>
+              <a:t>Conclusion</a:t>
+            </a:r>
+            <a:r>
+              <a:rPr lang="en" sz="2000" b="1" dirty="0">
+                <a:solidFill>
+                  <a:srgbClr val="404040"/>
+                </a:solidFill>
+                <a:highlight>
+                  <a:schemeClr val="lt1"/>
+                </a:highlight>
+                <a:latin typeface="Cairo" pitchFamily="2" charset="-78"/>
+                <a:ea typeface="Cambria"/>
+                <a:cs typeface="Cairo" pitchFamily="2" charset="-78"/>
+                <a:sym typeface="Cambria"/>
+              </a:rPr>
+              <a:t>:</a:t>
             </a:r>
             <a:r>
               <a:rPr lang="en" sz="2000" dirty="0">
@@ -9529,7 +9501,66 @@
                 <a:cs typeface="Cairo" pitchFamily="2" charset="-78"/>
                 <a:sym typeface="Cambria"/>
               </a:rPr>
-              <a:t>[Conclusion - what does the above suggest in terms of treatment and control - do you have statistically significant evidence of a difference?]</a:t>
+              <a:t>[Conclusion - what does the above suggest in terms of </a:t>
+            </a:r>
+            <a:r>
+              <a:rPr lang="en" sz="2000" b="1" dirty="0" smtClean="0">
+                <a:solidFill>
+                  <a:srgbClr val="FF0000"/>
+                </a:solidFill>
+                <a:highlight>
+                  <a:schemeClr val="lt1"/>
+                </a:highlight>
+                <a:latin typeface="Cairo" pitchFamily="2" charset="-78"/>
+                <a:ea typeface="Cambria"/>
+                <a:cs typeface="Cairo" pitchFamily="2" charset="-78"/>
+                <a:sym typeface="Cambria"/>
+              </a:rPr>
+              <a:t>treatment</a:t>
+            </a:r>
+          </a:p>
+          <a:p>
+            <a:pPr marL="0" lvl="0" indent="0" algn="l" rtl="0">
+              <a:lnSpc>
+                <a:spcPct val="108750"/>
+              </a:lnSpc>
+              <a:spcBef>
+                <a:spcPts val="0"/>
+              </a:spcBef>
+              <a:spcAft>
+                <a:spcPts val="0"/>
+              </a:spcAft>
+              <a:buNone/>
+            </a:pPr>
+            <a:r>
+              <a:rPr lang="en" sz="2000" b="1" dirty="0" smtClean="0">
+                <a:solidFill>
+                  <a:srgbClr val="FF0000"/>
+                </a:solidFill>
+                <a:highlight>
+                  <a:schemeClr val="lt1"/>
+                </a:highlight>
+                <a:latin typeface="Cairo" pitchFamily="2" charset="-78"/>
+                <a:ea typeface="Cambria"/>
+                <a:cs typeface="Cairo" pitchFamily="2" charset="-78"/>
+                <a:sym typeface="Cambria"/>
+              </a:rPr>
+              <a:t> </a:t>
+            </a:r>
+            <a:r>
+              <a:rPr lang="en" sz="2000" b="1" dirty="0">
+                <a:solidFill>
+                  <a:srgbClr val="FF0000"/>
+                </a:solidFill>
+                <a:highlight>
+                  <a:schemeClr val="lt1"/>
+                </a:highlight>
+                <a:latin typeface="Cairo" pitchFamily="2" charset="-78"/>
+                <a:ea typeface="Cambria"/>
+                <a:cs typeface="Cairo" pitchFamily="2" charset="-78"/>
+                <a:sym typeface="Cambria"/>
+              </a:rPr>
+              <a:t>and control - do you have statistically significant evidence of a difference?]</a:t>
             </a:r>
             <a:endParaRPr sz="2000" dirty="0">
               <a:solidFill>

</xml_diff>

<commit_message>
style: changed the font of the presentation
</commit_message>
<xml_diff>
--- a/analyze-a_b-test-results.pptx
+++ b/analyze-a_b-test-results.pptx
@@ -18,19 +18,19 @@
   <p:notesSz cx="6858000" cy="9144000"/>
   <p:embeddedFontLst>
     <p:embeddedFont>
-      <p:font typeface="Open Sans" panose="020B0604020202020204" charset="0"/>
+      <p:font typeface="Cairo" pitchFamily="2" charset="-78"/>
       <p:regular r:id="rId8"/>
       <p:bold r:id="rId9"/>
-      <p:italic r:id="rId10"/>
-      <p:boldItalic r:id="rId11"/>
-    </p:embeddedFont>
-    <p:embeddedFont>
-      <p:font typeface="Cairo" pitchFamily="2" charset="-78"/>
-      <p:regular r:id="rId12"/>
-      <p:bold r:id="rId13"/>
     </p:embeddedFont>
     <p:embeddedFont>
       <p:font typeface="Cambria" panose="02040503050406030204" pitchFamily="18" charset="0"/>
+      <p:regular r:id="rId10"/>
+      <p:bold r:id="rId11"/>
+      <p:italic r:id="rId12"/>
+      <p:boldItalic r:id="rId13"/>
+    </p:embeddedFont>
+    <p:embeddedFont>
+      <p:font typeface="Open Sans" panose="020B0604020202020204" charset="0"/>
       <p:regular r:id="rId14"/>
       <p:bold r:id="rId15"/>
       <p:italic r:id="rId16"/>
@@ -8018,7 +8018,7 @@
               <a:buNone/>
             </a:pPr>
             <a:r>
-              <a:rPr lang="en" dirty="0" smtClean="0">
+              <a:rPr lang="en" b="1" dirty="0" smtClean="0">
                 <a:solidFill>
                   <a:srgbClr val="FFFFFF"/>
                 </a:solidFill>
@@ -8036,7 +8036,7 @@
               </a:rPr>
               <a:t>Ammar Yasser</a:t>
             </a:r>
-            <a:endParaRPr dirty="0">
+            <a:endParaRPr b="1" dirty="0">
               <a:solidFill>
                 <a:srgbClr val="FFFFFF"/>
               </a:solidFill>
@@ -8496,28 +8496,28 @@
                 <a:gridCol w="1809750">
                   <a:extLst>
                     <a:ext uri="{9D8B030D-6E8A-4147-A177-3AD203B41FA5}">
-                      <a16:colId xmlns="" xmlns:a16="http://schemas.microsoft.com/office/drawing/2014/main" val="20000"/>
+                      <a16:colId xmlns:a16="http://schemas.microsoft.com/office/drawing/2014/main" xmlns="" val="20000"/>
                     </a:ext>
                   </a:extLst>
                 </a:gridCol>
                 <a:gridCol w="1809750">
                   <a:extLst>
                     <a:ext uri="{9D8B030D-6E8A-4147-A177-3AD203B41FA5}">
-                      <a16:colId xmlns="" xmlns:a16="http://schemas.microsoft.com/office/drawing/2014/main" val="20001"/>
+                      <a16:colId xmlns:a16="http://schemas.microsoft.com/office/drawing/2014/main" xmlns="" val="20001"/>
                     </a:ext>
                   </a:extLst>
                 </a:gridCol>
                 <a:gridCol w="1809750">
                   <a:extLst>
                     <a:ext uri="{9D8B030D-6E8A-4147-A177-3AD203B41FA5}">
-                      <a16:colId xmlns="" xmlns:a16="http://schemas.microsoft.com/office/drawing/2014/main" val="20002"/>
+                      <a16:colId xmlns:a16="http://schemas.microsoft.com/office/drawing/2014/main" xmlns="" val="20002"/>
                     </a:ext>
                   </a:extLst>
                 </a:gridCol>
                 <a:gridCol w="1809750">
                   <a:extLst>
                     <a:ext uri="{9D8B030D-6E8A-4147-A177-3AD203B41FA5}">
-                      <a16:colId xmlns="" xmlns:a16="http://schemas.microsoft.com/office/drawing/2014/main" val="20003"/>
+                      <a16:colId xmlns:a16="http://schemas.microsoft.com/office/drawing/2014/main" xmlns="" val="20003"/>
                     </a:ext>
                   </a:extLst>
                 </a:gridCol>
@@ -8629,7 +8629,7 @@
                 </a:tc>
                 <a:extLst>
                   <a:ext uri="{0D108BD9-81ED-4DB2-BD59-A6C34878D82A}">
-                    <a16:rowId xmlns="" xmlns:a16="http://schemas.microsoft.com/office/drawing/2014/main" val="10000"/>
+                    <a16:rowId xmlns:a16="http://schemas.microsoft.com/office/drawing/2014/main" xmlns="" val="10000"/>
                   </a:ext>
                 </a:extLst>
               </a:tr>
@@ -8770,7 +8770,7 @@
                 </a:tc>
                 <a:extLst>
                   <a:ext uri="{0D108BD9-81ED-4DB2-BD59-A6C34878D82A}">
-                    <a16:rowId xmlns="" xmlns:a16="http://schemas.microsoft.com/office/drawing/2014/main" val="10001"/>
+                    <a16:rowId xmlns:a16="http://schemas.microsoft.com/office/drawing/2014/main" xmlns="" val="10001"/>
                   </a:ext>
                 </a:extLst>
               </a:tr>
@@ -8912,7 +8912,7 @@
                 </a:tc>
                 <a:extLst>
                   <a:ext uri="{0D108BD9-81ED-4DB2-BD59-A6C34878D82A}">
-                    <a16:rowId xmlns="" xmlns:a16="http://schemas.microsoft.com/office/drawing/2014/main" val="10002"/>
+                    <a16:rowId xmlns:a16="http://schemas.microsoft.com/office/drawing/2014/main" xmlns="" val="10002"/>
                   </a:ext>
                 </a:extLst>
               </a:tr>

</xml_diff>

<commit_message>
style: Finish the presentation, Feat: finish the notebook
</commit_message>
<xml_diff>
--- a/analyze-a_b-test-results.pptx
+++ b/analyze-a_b-test-results.pptx
@@ -18,23 +18,23 @@
   <p:notesSz cx="6858000" cy="9144000"/>
   <p:embeddedFontLst>
     <p:embeddedFont>
-      <p:font typeface="Cairo" pitchFamily="2" charset="-78"/>
+      <p:font typeface="Cambria" panose="02040503050406030204" pitchFamily="18" charset="0"/>
       <p:regular r:id="rId8"/>
       <p:bold r:id="rId9"/>
-    </p:embeddedFont>
-    <p:embeddedFont>
-      <p:font typeface="Cambria" panose="02040503050406030204" pitchFamily="18" charset="0"/>
-      <p:regular r:id="rId10"/>
-      <p:bold r:id="rId11"/>
-      <p:italic r:id="rId12"/>
-      <p:boldItalic r:id="rId13"/>
+      <p:italic r:id="rId10"/>
+      <p:boldItalic r:id="rId11"/>
     </p:embeddedFont>
     <p:embeddedFont>
       <p:font typeface="Open Sans" panose="020B0604020202020204" charset="0"/>
-      <p:regular r:id="rId14"/>
-      <p:bold r:id="rId15"/>
-      <p:italic r:id="rId16"/>
-      <p:boldItalic r:id="rId17"/>
+      <p:regular r:id="rId12"/>
+      <p:bold r:id="rId13"/>
+      <p:italic r:id="rId14"/>
+      <p:boldItalic r:id="rId15"/>
+    </p:embeddedFont>
+    <p:embeddedFont>
+      <p:font typeface="Cairo" pitchFamily="2" charset="-78"/>
+      <p:regular r:id="rId16"/>
+      <p:bold r:id="rId17"/>
     </p:embeddedFont>
   </p:embeddedFontLst>
   <p:defaultTextStyle>
@@ -1045,7 +1045,7 @@
               </a:spcAft>
               <a:buNone/>
             </a:pPr>
-            <a:endParaRPr/>
+            <a:endParaRPr dirty="0"/>
           </a:p>
         </p:txBody>
       </p:sp>
@@ -8137,7 +8137,7 @@
         <p:spPr>
           <a:xfrm>
             <a:off x="118100" y="1020700"/>
-            <a:ext cx="9076500" cy="1227998"/>
+            <a:ext cx="9076500" cy="892522"/>
           </a:xfrm>
           <a:prstGeom prst="rect">
             <a:avLst/>
@@ -8155,17 +8155,10 @@
           </a:bodyPr>
           <a:lstStyle/>
           <a:p>
-            <a:pPr marL="0" lvl="0" indent="0" algn="l" rtl="0">
+            <a:pPr lvl="0">
               <a:lnSpc>
                 <a:spcPct val="115000"/>
               </a:lnSpc>
-              <a:spcBef>
-                <a:spcPts val="0"/>
-              </a:spcBef>
-              <a:spcAft>
-                <a:spcPts val="0"/>
-              </a:spcAft>
-              <a:buNone/>
             </a:pPr>
             <a:r>
               <a:rPr lang="en" sz="2000" b="1" dirty="0">
@@ -8183,7 +8176,15 @@
               <a:t>Total Variant Visitors: </a:t>
             </a:r>
             <a:r>
-              <a:rPr lang="en" sz="2000" b="1" dirty="0">
+              <a:rPr lang="en-US" sz="2000" dirty="0">
+                <a:solidFill>
+                  <a:srgbClr val="FF0000"/>
+                </a:solidFill>
+              </a:rPr>
+              <a:t>35211</a:t>
+            </a:r>
+            <a:r>
+              <a:rPr lang="en" sz="2000" b="1" dirty="0" smtClean="0">
                 <a:solidFill>
                   <a:srgbClr val="FF0000"/>
                 </a:solidFill>
@@ -8195,38 +8196,12 @@
                 <a:cs typeface="Cairo" pitchFamily="2" charset="-78"/>
                 <a:sym typeface="Cambria"/>
               </a:rPr>
-              <a:t>[The number of variant visitors]</a:t>
+              <a:t/>
             </a:r>
-            <a:endParaRPr sz="2000" dirty="0">
-              <a:solidFill>
-                <a:srgbClr val="FF0000"/>
-              </a:solidFill>
-              <a:highlight>
-                <a:schemeClr val="lt1"/>
-              </a:highlight>
-              <a:latin typeface="Cairo" pitchFamily="2" charset="-78"/>
-              <a:ea typeface="Cambria"/>
-              <a:cs typeface="Cairo" pitchFamily="2" charset="-78"/>
-              <a:sym typeface="Cambria"/>
-            </a:endParaRPr>
-          </a:p>
-          <a:p>
-            <a:pPr marL="0" lvl="0" indent="0" algn="l" rtl="0">
-              <a:lnSpc>
-                <a:spcPct val="115000"/>
-              </a:lnSpc>
-              <a:spcBef>
-                <a:spcPts val="0"/>
-              </a:spcBef>
-              <a:spcAft>
-                <a:spcPts val="0"/>
-              </a:spcAft>
-              <a:buNone/>
-            </a:pPr>
-            <a:r>
-              <a:rPr lang="en" sz="2000" b="1" dirty="0">
-                <a:solidFill>
-                  <a:srgbClr val="404040"/>
+            <a:br>
+              <a:rPr lang="en" sz="2000" b="1" dirty="0" smtClean="0">
+                <a:solidFill>
+                  <a:srgbClr val="FF0000"/>
                 </a:solidFill>
                 <a:highlight>
                   <a:schemeClr val="lt1"/>
@@ -8236,12 +8211,41 @@
                 <a:cs typeface="Cairo" pitchFamily="2" charset="-78"/>
                 <a:sym typeface="Cambria"/>
               </a:rPr>
-              <a:t>Total Control Participants:</a:t>
+            </a:br>
+            <a:r>
+              <a:rPr lang="en" sz="2000" b="1" dirty="0" smtClean="0">
+                <a:solidFill>
+                  <a:srgbClr val="404040"/>
+                </a:solidFill>
+                <a:highlight>
+                  <a:schemeClr val="lt1"/>
+                </a:highlight>
+                <a:latin typeface="Cairo" pitchFamily="2" charset="-78"/>
+                <a:ea typeface="Cambria"/>
+                <a:cs typeface="Cairo" pitchFamily="2" charset="-78"/>
+                <a:sym typeface="Cambria"/>
+              </a:rPr>
+              <a:t>Total </a:t>
+            </a:r>
+            <a:r>
+              <a:rPr lang="en" sz="2000" b="1" dirty="0">
+                <a:solidFill>
+                  <a:srgbClr val="404040"/>
+                </a:solidFill>
+                <a:highlight>
+                  <a:schemeClr val="lt1"/>
+                </a:highlight>
+                <a:latin typeface="Cairo" pitchFamily="2" charset="-78"/>
+                <a:ea typeface="Cambria"/>
+                <a:cs typeface="Cairo" pitchFamily="2" charset="-78"/>
+                <a:sym typeface="Cambria"/>
+              </a:rPr>
+              <a:t>Control Participants:</a:t>
             </a:r>
             <a:r>
               <a:rPr lang="en" sz="2000" dirty="0">
                 <a:solidFill>
-                  <a:schemeClr val="dk1"/>
+                  <a:srgbClr val="FF0000"/>
                 </a:solidFill>
                 <a:highlight>
                   <a:schemeClr val="lt1"/>
@@ -8254,50 +8258,17 @@
               <a:t>​ </a:t>
             </a:r>
             <a:r>
-              <a:rPr lang="en" sz="2000" b="1" dirty="0">
+              <a:rPr lang="en-US" sz="2000" dirty="0">
                 <a:solidFill>
                   <a:srgbClr val="FF0000"/>
                 </a:solidFill>
-                <a:highlight>
-                  <a:schemeClr val="lt1"/>
-                </a:highlight>
-                <a:latin typeface="Cairo" pitchFamily="2" charset="-78"/>
-                <a:ea typeface="Cambria"/>
-                <a:cs typeface="Cairo" pitchFamily="2" charset="-78"/>
-                <a:sym typeface="Cambria"/>
               </a:rPr>
-              <a:t>[The number of control visitors]</a:t>
+              <a:t>34678</a:t>
             </a:r>
-            <a:endParaRPr sz="2000" dirty="0">
-              <a:solidFill>
-                <a:srgbClr val="FF0000"/>
-              </a:solidFill>
-              <a:highlight>
-                <a:schemeClr val="lt1"/>
-              </a:highlight>
-              <a:latin typeface="Cairo" pitchFamily="2" charset="-78"/>
-              <a:ea typeface="Cambria"/>
-              <a:cs typeface="Cairo" pitchFamily="2" charset="-78"/>
-              <a:sym typeface="Cambria"/>
-            </a:endParaRPr>
-          </a:p>
-          <a:p>
-            <a:pPr marL="0" lvl="0" indent="0" algn="l" rtl="0">
-              <a:lnSpc>
-                <a:spcPct val="108750"/>
-              </a:lnSpc>
-              <a:spcBef>
-                <a:spcPts val="0"/>
-              </a:spcBef>
-              <a:spcAft>
-                <a:spcPts val="0"/>
-              </a:spcAft>
-              <a:buNone/>
-            </a:pPr>
             <a:r>
               <a:rPr lang="en" sz="2000" dirty="0" smtClean="0">
                 <a:solidFill>
-                  <a:schemeClr val="dk1"/>
+                  <a:srgbClr val="FF0000"/>
                 </a:solidFill>
                 <a:highlight>
                   <a:schemeClr val="lt1"/>
@@ -8311,7 +8282,7 @@
             </a:r>
             <a:endParaRPr sz="2000" dirty="0">
               <a:solidFill>
-                <a:schemeClr val="dk1"/>
+                <a:srgbClr val="FF0000"/>
               </a:solidFill>
               <a:highlight>
                 <a:schemeClr val="lt1"/>
@@ -8384,6 +8355,30 @@
           </a:p>
         </p:txBody>
       </p:sp>
+      <p:pic>
+        <p:nvPicPr>
+          <p:cNvPr id="3" name="Picture 2"/>
+          <p:cNvPicPr>
+            <a:picLocks noChangeAspect="1"/>
+          </p:cNvPicPr>
+          <p:nvPr/>
+        </p:nvPicPr>
+        <p:blipFill>
+          <a:blip r:embed="rId3"/>
+          <a:stretch>
+            <a:fillRect/>
+          </a:stretch>
+        </p:blipFill>
+        <p:spPr>
+          <a:xfrm>
+            <a:off x="1295799" y="1911754"/>
+            <a:ext cx="5417284" cy="3231746"/>
+          </a:xfrm>
+          <a:prstGeom prst="rect">
+            <a:avLst/>
+          </a:prstGeom>
+        </p:spPr>
+      </p:pic>
     </p:spTree>
   </p:cSld>
   <p:clrMapOvr>
@@ -8476,13 +8471,13 @@
           <p:nvPr>
             <p:extLst>
               <p:ext uri="{D42A27DB-BD31-4B8C-83A1-F6EECF244321}">
-                <p14:modId xmlns:p14="http://schemas.microsoft.com/office/powerpoint/2010/main" val="2977283963"/>
+                <p14:modId xmlns:p14="http://schemas.microsoft.com/office/powerpoint/2010/main" val="1593244357"/>
               </p:ext>
             </p:extLst>
           </p:nvPr>
         </p:nvGraphicFramePr>
         <p:xfrm>
-          <a:off x="825950" y="1122975"/>
+          <a:off x="681571" y="863600"/>
           <a:ext cx="7239000" cy="1234350"/>
         </p:xfrm>
         <a:graphic>
@@ -8496,28 +8491,28 @@
                 <a:gridCol w="1809750">
                   <a:extLst>
                     <a:ext uri="{9D8B030D-6E8A-4147-A177-3AD203B41FA5}">
-                      <a16:colId xmlns:a16="http://schemas.microsoft.com/office/drawing/2014/main" xmlns="" val="20000"/>
+                      <a16:colId xmlns="" xmlns:a16="http://schemas.microsoft.com/office/drawing/2014/main" val="20000"/>
                     </a:ext>
                   </a:extLst>
                 </a:gridCol>
                 <a:gridCol w="1809750">
                   <a:extLst>
                     <a:ext uri="{9D8B030D-6E8A-4147-A177-3AD203B41FA5}">
-                      <a16:colId xmlns:a16="http://schemas.microsoft.com/office/drawing/2014/main" xmlns="" val="20001"/>
+                      <a16:colId xmlns="" xmlns:a16="http://schemas.microsoft.com/office/drawing/2014/main" val="20001"/>
                     </a:ext>
                   </a:extLst>
                 </a:gridCol>
                 <a:gridCol w="1809750">
                   <a:extLst>
                     <a:ext uri="{9D8B030D-6E8A-4147-A177-3AD203B41FA5}">
-                      <a16:colId xmlns:a16="http://schemas.microsoft.com/office/drawing/2014/main" xmlns="" val="20002"/>
+                      <a16:colId xmlns="" xmlns:a16="http://schemas.microsoft.com/office/drawing/2014/main" val="20002"/>
                     </a:ext>
                   </a:extLst>
                 </a:gridCol>
                 <a:gridCol w="1809750">
                   <a:extLst>
                     <a:ext uri="{9D8B030D-6E8A-4147-A177-3AD203B41FA5}">
-                      <a16:colId xmlns:a16="http://schemas.microsoft.com/office/drawing/2014/main" xmlns="" val="20003"/>
+                      <a16:colId xmlns="" xmlns:a16="http://schemas.microsoft.com/office/drawing/2014/main" val="20003"/>
                     </a:ext>
                   </a:extLst>
                 </a:gridCol>
@@ -8537,7 +8532,7 @@
                         </a:spcAft>
                         <a:buNone/>
                       </a:pPr>
-                      <a:endParaRPr sz="1500" b="1"/>
+                      <a:endParaRPr sz="1500" b="1" dirty="0"/>
                     </a:p>
                   </a:txBody>
                   <a:tcPr marL="91425" marR="91425" marT="91425" marB="91425">
@@ -8629,7 +8624,7 @@
                 </a:tc>
                 <a:extLst>
                   <a:ext uri="{0D108BD9-81ED-4DB2-BD59-A6C34878D82A}">
-                    <a16:rowId xmlns:a16="http://schemas.microsoft.com/office/drawing/2014/main" xmlns="" val="10000"/>
+                    <a16:rowId xmlns="" xmlns:a16="http://schemas.microsoft.com/office/drawing/2014/main" val="10000"/>
                   </a:ext>
                 </a:extLst>
               </a:tr>
@@ -8666,27 +8661,28 @@
                     <a:bodyPr/>
                     <a:lstStyle/>
                     <a:p>
-                      <a:pPr marL="0" lvl="0" indent="0" algn="l" rtl="0">
-                        <a:spcBef>
-                          <a:spcPts val="0"/>
-                        </a:spcBef>
-                        <a:spcAft>
-                          <a:spcPts val="0"/>
-                        </a:spcAft>
-                        <a:buNone/>
-                      </a:pPr>
                       <a:r>
-                        <a:rPr lang="en" sz="1500" b="1">
+                        <a:rPr lang="en-US" sz="1400" b="0" i="0" u="none" strike="noStrike" cap="none" dirty="0" smtClean="0">
                           <a:solidFill>
-                            <a:srgbClr val="FF0000"/>
+                            <a:srgbClr val="000000"/>
                           </a:solidFill>
+                          <a:effectLst/>
+                          <a:latin typeface="Arial"/>
+                          <a:ea typeface="Arial"/>
+                          <a:cs typeface="Arial"/>
+                          <a:sym typeface="Arial"/>
                         </a:rPr>
-                        <a:t>Your Values Here</a:t>
+                        <a:t>10.7%</a:t>
                       </a:r>
-                      <a:endParaRPr sz="1500" b="1">
+                      <a:endParaRPr lang="en-US" sz="1400" b="0" i="0" u="none" strike="noStrike" cap="none" dirty="0">
                         <a:solidFill>
-                          <a:srgbClr val="FF0000"/>
+                          <a:srgbClr val="000000"/>
                         </a:solidFill>
+                        <a:effectLst/>
+                        <a:latin typeface="Arial"/>
+                        <a:ea typeface="Arial"/>
+                        <a:cs typeface="Arial"/>
+                        <a:sym typeface="Arial"/>
                       </a:endParaRPr>
                     </a:p>
                   </a:txBody>
@@ -8701,29 +8697,29 @@
                     <a:bodyPr/>
                     <a:lstStyle/>
                     <a:p>
-                      <a:pPr marL="0" lvl="0" indent="0" algn="l" rtl="0">
-                        <a:spcBef>
-                          <a:spcPts val="0"/>
-                        </a:spcBef>
-                        <a:spcAft>
-                          <a:spcPts val="0"/>
-                        </a:spcAft>
-                        <a:buClr>
-                          <a:schemeClr val="dk1"/>
-                        </a:buClr>
-                        <a:buSzPts val="1100"/>
-                        <a:buFont typeface="Arial"/>
-                        <a:buNone/>
-                      </a:pPr>
                       <a:r>
-                        <a:rPr lang="en" sz="1500" b="1">
+                        <a:rPr lang="en-US" sz="1400" b="0" i="0" u="none" strike="noStrike" cap="none" dirty="0" smtClean="0">
                           <a:solidFill>
-                            <a:srgbClr val="FF0000"/>
+                            <a:srgbClr val="000000"/>
                           </a:solidFill>
+                          <a:effectLst/>
+                          <a:latin typeface="Arial"/>
+                          <a:ea typeface="Arial"/>
+                          <a:cs typeface="Arial"/>
+                          <a:sym typeface="Arial"/>
                         </a:rPr>
-                        <a:t>Your Values Here</a:t>
+                        <a:t>10%</a:t>
                       </a:r>
-                      <a:endParaRPr sz="1500" b="1"/>
+                      <a:endParaRPr lang="en-US" sz="1400" b="0" i="0" u="none" strike="noStrike" cap="none" dirty="0">
+                        <a:solidFill>
+                          <a:srgbClr val="000000"/>
+                        </a:solidFill>
+                        <a:effectLst/>
+                        <a:latin typeface="Arial"/>
+                        <a:ea typeface="Arial"/>
+                        <a:cs typeface="Arial"/>
+                        <a:sym typeface="Arial"/>
+                      </a:endParaRPr>
                     </a:p>
                   </a:txBody>
                   <a:tcPr marL="91425" marR="91425" marT="91425" marB="91425">
@@ -8737,29 +8733,29 @@
                     <a:bodyPr/>
                     <a:lstStyle/>
                     <a:p>
-                      <a:pPr marL="0" lvl="0" indent="0" algn="l" rtl="0">
-                        <a:spcBef>
-                          <a:spcPts val="0"/>
-                        </a:spcBef>
-                        <a:spcAft>
-                          <a:spcPts val="0"/>
-                        </a:spcAft>
-                        <a:buClr>
-                          <a:schemeClr val="dk1"/>
-                        </a:buClr>
-                        <a:buSzPts val="1100"/>
-                        <a:buFont typeface="Arial"/>
-                        <a:buNone/>
-                      </a:pPr>
                       <a:r>
-                        <a:rPr lang="en" sz="1500" b="1">
+                        <a:rPr lang="en-US" sz="1400" b="0" i="0" u="none" strike="noStrike" cap="none" dirty="0" smtClean="0">
                           <a:solidFill>
-                            <a:srgbClr val="FF0000"/>
+                            <a:srgbClr val="000000"/>
                           </a:solidFill>
+                          <a:effectLst/>
+                          <a:latin typeface="Arial"/>
+                          <a:ea typeface="Arial"/>
+                          <a:cs typeface="Arial"/>
+                          <a:sym typeface="Arial"/>
                         </a:rPr>
-                        <a:t>Your Values Here</a:t>
+                        <a:t>9%</a:t>
                       </a:r>
-                      <a:endParaRPr sz="1500" b="1"/>
+                      <a:endParaRPr lang="en-US" sz="1400" b="0" i="0" u="none" strike="noStrike" cap="none" dirty="0">
+                        <a:solidFill>
+                          <a:srgbClr val="000000"/>
+                        </a:solidFill>
+                        <a:effectLst/>
+                        <a:latin typeface="Arial"/>
+                        <a:ea typeface="Arial"/>
+                        <a:cs typeface="Arial"/>
+                        <a:sym typeface="Arial"/>
+                      </a:endParaRPr>
                     </a:p>
                   </a:txBody>
                   <a:tcPr marL="91425" marR="91425" marT="91425" marB="91425">
@@ -8770,7 +8766,7 @@
                 </a:tc>
                 <a:extLst>
                   <a:ext uri="{0D108BD9-81ED-4DB2-BD59-A6C34878D82A}">
-                    <a16:rowId xmlns:a16="http://schemas.microsoft.com/office/drawing/2014/main" xmlns="" val="10001"/>
+                    <a16:rowId xmlns="" xmlns:a16="http://schemas.microsoft.com/office/drawing/2014/main" val="10001"/>
                   </a:ext>
                 </a:extLst>
               </a:tr>
@@ -8807,29 +8803,29 @@
                     <a:bodyPr/>
                     <a:lstStyle/>
                     <a:p>
-                      <a:pPr marL="0" lvl="0" indent="0" algn="l" rtl="0">
-                        <a:spcBef>
-                          <a:spcPts val="0"/>
-                        </a:spcBef>
-                        <a:spcAft>
-                          <a:spcPts val="0"/>
-                        </a:spcAft>
-                        <a:buClr>
-                          <a:schemeClr val="dk1"/>
-                        </a:buClr>
-                        <a:buSzPts val="1100"/>
-                        <a:buFont typeface="Arial"/>
-                        <a:buNone/>
-                      </a:pPr>
                       <a:r>
-                        <a:rPr lang="en" sz="1500" b="1">
+                        <a:rPr lang="en-US" sz="1400" b="0" i="0" u="none" strike="noStrike" cap="none" dirty="0" smtClean="0">
                           <a:solidFill>
-                            <a:srgbClr val="FF0000"/>
+                            <a:srgbClr val="000000"/>
                           </a:solidFill>
+                          <a:effectLst/>
+                          <a:latin typeface="Arial"/>
+                          <a:ea typeface="Arial"/>
+                          <a:cs typeface="Arial"/>
+                          <a:sym typeface="Arial"/>
                         </a:rPr>
-                        <a:t>Your Values Here</a:t>
+                        <a:t>15.8%</a:t>
                       </a:r>
-                      <a:endParaRPr sz="1500" b="1"/>
+                      <a:endParaRPr lang="en-US" sz="1400" b="0" i="0" u="none" strike="noStrike" cap="none" dirty="0">
+                        <a:solidFill>
+                          <a:srgbClr val="000000"/>
+                        </a:solidFill>
+                        <a:effectLst/>
+                        <a:latin typeface="Arial"/>
+                        <a:ea typeface="Arial"/>
+                        <a:cs typeface="Arial"/>
+                        <a:sym typeface="Arial"/>
+                      </a:endParaRPr>
                     </a:p>
                   </a:txBody>
                   <a:tcPr marL="91425" marR="91425" marT="91425" marB="91425">
@@ -8843,29 +8839,29 @@
                     <a:bodyPr/>
                     <a:lstStyle/>
                     <a:p>
-                      <a:pPr marL="0" lvl="0" indent="0" algn="l" rtl="0">
-                        <a:spcBef>
-                          <a:spcPts val="0"/>
-                        </a:spcBef>
-                        <a:spcAft>
-                          <a:spcPts val="0"/>
-                        </a:spcAft>
-                        <a:buClr>
-                          <a:schemeClr val="dk1"/>
-                        </a:buClr>
-                        <a:buSzPts val="1100"/>
-                        <a:buFont typeface="Arial"/>
-                        <a:buNone/>
-                      </a:pPr>
                       <a:r>
-                        <a:rPr lang="en" sz="1500" b="1">
+                        <a:rPr lang="en-US" sz="1400" b="0" i="0" u="none" strike="noStrike" cap="none" dirty="0" smtClean="0">
                           <a:solidFill>
-                            <a:srgbClr val="FF0000"/>
+                            <a:srgbClr val="000000"/>
                           </a:solidFill>
+                          <a:effectLst/>
+                          <a:latin typeface="Arial"/>
+                          <a:ea typeface="Arial"/>
+                          <a:cs typeface="Arial"/>
+                          <a:sym typeface="Arial"/>
                         </a:rPr>
-                        <a:t>Your Values Here</a:t>
+                        <a:t>14% </a:t>
                       </a:r>
-                      <a:endParaRPr sz="1500" b="1"/>
+                      <a:endParaRPr lang="en-US" sz="1400" b="0" i="0" u="none" strike="noStrike" cap="none" dirty="0">
+                        <a:solidFill>
+                          <a:srgbClr val="000000"/>
+                        </a:solidFill>
+                        <a:effectLst/>
+                        <a:latin typeface="Arial"/>
+                        <a:ea typeface="Arial"/>
+                        <a:cs typeface="Arial"/>
+                        <a:sym typeface="Arial"/>
+                      </a:endParaRPr>
                     </a:p>
                   </a:txBody>
                   <a:tcPr marL="91425" marR="91425" marT="91425" marB="91425">
@@ -8879,29 +8875,29 @@
                     <a:bodyPr/>
                     <a:lstStyle/>
                     <a:p>
-                      <a:pPr marL="0" lvl="0" indent="0" algn="l" rtl="0">
-                        <a:spcBef>
-                          <a:spcPts val="0"/>
-                        </a:spcBef>
-                        <a:spcAft>
-                          <a:spcPts val="0"/>
-                        </a:spcAft>
-                        <a:buClr>
-                          <a:schemeClr val="dk1"/>
-                        </a:buClr>
-                        <a:buSzPts val="1100"/>
-                        <a:buFont typeface="Arial"/>
-                        <a:buNone/>
-                      </a:pPr>
                       <a:r>
-                        <a:rPr lang="en" sz="1500" b="1" dirty="0">
+                        <a:rPr lang="en-US" sz="1400" b="0" i="0" u="none" strike="noStrike" cap="none" dirty="0" smtClean="0">
                           <a:solidFill>
-                            <a:srgbClr val="FF0000"/>
+                            <a:srgbClr val="000000"/>
                           </a:solidFill>
+                          <a:effectLst/>
+                          <a:latin typeface="Arial"/>
+                          <a:ea typeface="Arial"/>
+                          <a:cs typeface="Arial"/>
+                          <a:sym typeface="Arial"/>
                         </a:rPr>
-                        <a:t>Your Values Here</a:t>
+                        <a:t>15%  </a:t>
                       </a:r>
-                      <a:endParaRPr sz="1500" b="1" dirty="0"/>
+                      <a:endParaRPr lang="en-US" sz="1400" b="0" i="0" u="none" strike="noStrike" cap="none" dirty="0">
+                        <a:solidFill>
+                          <a:srgbClr val="000000"/>
+                        </a:solidFill>
+                        <a:effectLst/>
+                        <a:latin typeface="Arial"/>
+                        <a:ea typeface="Arial"/>
+                        <a:cs typeface="Arial"/>
+                        <a:sym typeface="Arial"/>
+                      </a:endParaRPr>
                     </a:p>
                   </a:txBody>
                   <a:tcPr marL="91425" marR="91425" marT="91425" marB="91425">
@@ -8912,7 +8908,7 @@
                 </a:tc>
                 <a:extLst>
                   <a:ext uri="{0D108BD9-81ED-4DB2-BD59-A6C34878D82A}">
-                    <a16:rowId xmlns:a16="http://schemas.microsoft.com/office/drawing/2014/main" xmlns="" val="10002"/>
+                    <a16:rowId xmlns="" xmlns:a16="http://schemas.microsoft.com/office/drawing/2014/main" val="10002"/>
                   </a:ext>
                 </a:extLst>
               </a:tr>
@@ -8922,14 +8918,16 @@
       </p:graphicFrame>
       <p:sp>
         <p:nvSpPr>
-          <p:cNvPr id="86" name="Google Shape;86;p18"/>
-          <p:cNvSpPr txBox="1"/>
+          <p:cNvPr id="4" name="Rectangle 3"/>
+          <p:cNvSpPr>
+            <a:spLocks noChangeArrowheads="1"/>
+          </p:cNvSpPr>
           <p:nvPr/>
         </p:nvSpPr>
-        <p:spPr>
+        <p:spPr bwMode="auto">
           <a:xfrm>
-            <a:off x="481400" y="2817975"/>
-            <a:ext cx="8207100" cy="892522"/>
+            <a:off x="304800" y="2462750"/>
+            <a:ext cx="8309810" cy="1754326"/>
           </a:xfrm>
           <a:prstGeom prst="rect">
             <a:avLst/>
@@ -8938,88 +8936,127 @@
           <a:ln>
             <a:noFill/>
           </a:ln>
+          <a:effectLst/>
+          <a:extLst>
+            <a:ext uri="{909E8E84-426E-40DD-AFC4-6F175D3DCCD1}">
+              <a14:hiddenFill xmlns:a14="http://schemas.microsoft.com/office/drawing/2010/main">
+                <a:solidFill>
+                  <a:schemeClr val="accent1"/>
+                </a:solidFill>
+              </a14:hiddenFill>
+            </a:ext>
+            <a:ext uri="{91240B29-F687-4F45-9708-019B960494DF}">
+              <a14:hiddenLine xmlns:a14="http://schemas.microsoft.com/office/drawing/2010/main" w="9525">
+                <a:solidFill>
+                  <a:schemeClr val="tx1"/>
+                </a:solidFill>
+                <a:miter lim="800000"/>
+                <a:headEnd/>
+                <a:tailEnd/>
+              </a14:hiddenLine>
+            </a:ext>
+            <a:ext uri="{AF507438-7753-43E0-B8FC-AC1667EBCBE1}">
+              <a14:hiddenEffects xmlns:a14="http://schemas.microsoft.com/office/drawing/2010/main">
+                <a:effectLst>
+                  <a:outerShdw dist="35921" dir="2700000" algn="ctr" rotWithShape="0">
+                    <a:schemeClr val="bg2"/>
+                  </a:outerShdw>
+                </a:effectLst>
+              </a14:hiddenEffects>
+            </a:ext>
+          </a:extLst>
         </p:spPr>
         <p:txBody>
-          <a:bodyPr spcFirstLastPara="1" wrap="square" lIns="91425" tIns="91425" rIns="91425" bIns="91425" anchor="t" anchorCtr="0">
+          <a:bodyPr vert="horz" wrap="square" lIns="91440" tIns="45720" rIns="91440" bIns="45720" numCol="1" anchor="ctr" anchorCtr="0" compatLnSpc="1">
+            <a:prstTxWarp prst="textNoShape">
+              <a:avLst/>
+            </a:prstTxWarp>
             <a:spAutoFit/>
           </a:bodyPr>
           <a:lstStyle/>
           <a:p>
-            <a:pPr marL="0" lvl="0" indent="0" algn="l" rtl="0">
+            <a:pPr marL="0" marR="0" lvl="0" indent="0" algn="l" defTabSz="914400" eaLnBrk="0" fontAlgn="base" latinLnBrk="0" hangingPunct="0">
               <a:lnSpc>
-                <a:spcPct val="115000"/>
+                <a:spcPct val="100000"/>
               </a:lnSpc>
               <a:spcBef>
-                <a:spcPts val="0"/>
-              </a:spcBef>
-              <a:spcAft>
-                <a:spcPts val="0"/>
-              </a:spcAft>
-              <a:buNone/>
+                <a:spcPct val="0"/>
+              </a:spcBef>
+              <a:spcAft>
+                <a:spcPct val="0"/>
+              </a:spcAft>
+              <a:buClrTx/>
+              <a:buSzTx/>
+              <a:buFontTx/>
+              <a:buNone/>
+              <a:tabLst/>
             </a:pPr>
             <a:r>
-              <a:rPr lang="en" sz="2000" b="1" dirty="0">
-                <a:solidFill>
-                  <a:srgbClr val="404040"/>
-                </a:solidFill>
-                <a:highlight>
-                  <a:schemeClr val="lt1"/>
-                </a:highlight>
-                <a:latin typeface="Cairo" pitchFamily="2" charset="-78"/>
-                <a:ea typeface="Cambria"/>
-                <a:cs typeface="Cairo" pitchFamily="2" charset="-78"/>
-                <a:sym typeface="Cambria"/>
+              <a:rPr kumimoji="0" lang="en-US" altLang="en-US" sz="1800" b="0" i="0" u="none" strike="noStrike" cap="none" normalizeH="0" baseline="0" dirty="0" smtClean="0">
+                <a:ln>
+                  <a:noFill/>
+                </a:ln>
+                <a:solidFill>
+                  <a:schemeClr val="tx1"/>
+                </a:solidFill>
+                <a:effectLst/>
+                <a:latin typeface="Arial" panose="020B0604020202020204" pitchFamily="34" charset="0"/>
               </a:rPr>
-              <a:t>Executive Summary: </a:t>
+              <a:t>The Treatment group generally had higher conversion rates than the </a:t>
             </a:r>
             <a:r>
-              <a:rPr lang="en" sz="2000" b="1" dirty="0">
-                <a:solidFill>
-                  <a:srgbClr val="FF0000"/>
-                </a:solidFill>
-                <a:highlight>
-                  <a:schemeClr val="lt1"/>
-                </a:highlight>
-                <a:latin typeface="Cairo" pitchFamily="2" charset="-78"/>
-                <a:ea typeface="Cambria"/>
-                <a:cs typeface="Cairo" pitchFamily="2" charset="-78"/>
-                <a:sym typeface="Cambria"/>
+              <a:rPr kumimoji="0" lang="en-US" altLang="en-US" sz="1800" b="0" i="0" u="none" strike="noStrike" cap="none" normalizeH="0" baseline="0" dirty="0" err="1" smtClean="0">
+                <a:ln>
+                  <a:noFill/>
+                </a:ln>
+                <a:solidFill>
+                  <a:schemeClr val="tx1"/>
+                </a:solidFill>
+                <a:effectLst/>
+                <a:latin typeface="Arial" panose="020B0604020202020204" pitchFamily="34" charset="0"/>
               </a:rPr>
-              <a:t>[What do these probabilities suggest in how the `Treatment` or </a:t>
+              <a:t>Cntrol</a:t>
             </a:r>
             <a:r>
-              <a:rPr lang="en" sz="2000" b="1" dirty="0" smtClean="0">
-                <a:solidFill>
-                  <a:srgbClr val="FF0000"/>
-                </a:solidFill>
-                <a:highlight>
-                  <a:schemeClr val="lt1"/>
-                </a:highlight>
-                <a:latin typeface="Cairo" pitchFamily="2" charset="-78"/>
-                <a:ea typeface="Cambria"/>
-                <a:cs typeface="Cairo" pitchFamily="2" charset="-78"/>
-                <a:sym typeface="Cambria"/>
+              <a:rPr kumimoji="0" lang="en-US" altLang="en-US" sz="1800" b="0" i="0" u="none" strike="noStrike" cap="none" normalizeH="0" baseline="0" dirty="0" smtClean="0">
+                <a:ln>
+                  <a:noFill/>
+                </a:ln>
+                <a:solidFill>
+                  <a:schemeClr val="tx1"/>
+                </a:solidFill>
+                <a:effectLst/>
+                <a:latin typeface="Arial" panose="020B0604020202020204" pitchFamily="34" charset="0"/>
               </a:rPr>
-              <a:t>`Country</a:t>
+              <a:t> group across all countries. In the US, UK, and Canada, the Treatment group outperformed the Control group by a noticeable margin. This suggests that the new page (Treatment) leads to better conversion rates, though country differences may also play a role, which would require further testing to confirm.</a:t>
             </a:r>
-            <a:r>
-              <a:rPr lang="en" sz="2000" b="1" dirty="0">
-                <a:solidFill>
-                  <a:srgbClr val="FF0000"/>
-                </a:solidFill>
-                <a:highlight>
-                  <a:schemeClr val="lt1"/>
-                </a:highlight>
-                <a:latin typeface="Cairo" pitchFamily="2" charset="-78"/>
-                <a:ea typeface="Cambria"/>
-                <a:cs typeface="Cairo" pitchFamily="2" charset="-78"/>
-                <a:sym typeface="Cambria"/>
-              </a:rPr>
-              <a:t>` are associated with conversion rates?]</a:t>
-            </a:r>
-            <a:endParaRPr dirty="0">
-              <a:latin typeface="Cairo" pitchFamily="2" charset="-78"/>
-              <a:cs typeface="Cairo" pitchFamily="2" charset="-78"/>
+          </a:p>
+          <a:p>
+            <a:pPr marL="0" marR="0" lvl="0" indent="0" algn="l" defTabSz="914400" eaLnBrk="0" fontAlgn="base" latinLnBrk="0" hangingPunct="0">
+              <a:lnSpc>
+                <a:spcPct val="100000"/>
+              </a:lnSpc>
+              <a:spcBef>
+                <a:spcPct val="0"/>
+              </a:spcBef>
+              <a:spcAft>
+                <a:spcPct val="0"/>
+              </a:spcAft>
+              <a:buClrTx/>
+              <a:buSzTx/>
+              <a:buFontTx/>
+              <a:buNone/>
+              <a:tabLst/>
+            </a:pPr>
+            <a:endParaRPr kumimoji="0" lang="en-US" altLang="en-US" sz="1800" b="0" i="0" u="none" strike="noStrike" cap="none" normalizeH="0" baseline="0" dirty="0" smtClean="0">
+              <a:ln>
+                <a:noFill/>
+              </a:ln>
+              <a:solidFill>
+                <a:schemeClr val="tx1"/>
+              </a:solidFill>
+              <a:effectLst/>
+              <a:latin typeface="Arial" panose="020B0604020202020204" pitchFamily="34" charset="0"/>
             </a:endParaRPr>
           </a:p>
         </p:txBody>
@@ -9084,7 +9121,7 @@
               <a:buNone/>
             </a:pPr>
             <a:r>
-              <a:rPr lang="en" sz="3150" b="1">
+              <a:rPr lang="en" sz="3150" b="1" dirty="0">
                 <a:solidFill>
                   <a:srgbClr val="073763"/>
                 </a:solidFill>
@@ -9096,7 +9133,7 @@
               </a:rPr>
               <a:t>Experiment Results</a:t>
             </a:r>
-            <a:endParaRPr sz="100" b="1">
+            <a:endParaRPr sz="100" b="1" dirty="0">
               <a:solidFill>
                 <a:srgbClr val="073763"/>
               </a:solidFill>
@@ -9118,7 +9155,7 @@
         <p:spPr>
           <a:xfrm>
             <a:off x="118100" y="1020700"/>
-            <a:ext cx="9076500" cy="2569904"/>
+            <a:ext cx="9076500" cy="4398097"/>
           </a:xfrm>
           <a:prstGeom prst="rect">
             <a:avLst/>
@@ -9136,17 +9173,10 @@
           </a:bodyPr>
           <a:lstStyle/>
           <a:p>
-            <a:pPr marL="0" lvl="0" indent="0" algn="l" rtl="0">
+            <a:pPr lvl="0">
               <a:lnSpc>
                 <a:spcPct val="115000"/>
               </a:lnSpc>
-              <a:spcBef>
-                <a:spcPts val="0"/>
-              </a:spcBef>
-              <a:spcAft>
-                <a:spcPts val="0"/>
-              </a:spcAft>
-              <a:buNone/>
             </a:pPr>
             <a:r>
               <a:rPr lang="en" sz="2000" b="1" dirty="0">
@@ -9164,9 +9194,44 @@
               <a:t>Treatment Conversion Rate: </a:t>
             </a:r>
             <a:r>
-              <a:rPr lang="en" sz="2000" b="1" dirty="0">
+              <a:rPr lang="en-US" sz="2000" b="1" dirty="0">
                 <a:solidFill>
                   <a:srgbClr val="FF0000"/>
+                </a:solidFill>
+                <a:highlight>
+                  <a:schemeClr val="lt1"/>
+                </a:highlight>
+                <a:latin typeface="Cairo" pitchFamily="2" charset="-78"/>
+                <a:ea typeface="Cambria"/>
+                <a:cs typeface="Cairo" pitchFamily="2" charset="-78"/>
+              </a:rPr>
+              <a:t>15.53</a:t>
+            </a:r>
+            <a:r>
+              <a:rPr lang="en-US" sz="2000" b="1" dirty="0">
+                <a:solidFill>
+                  <a:srgbClr val="FF0000"/>
+                </a:solidFill>
+                <a:highlight>
+                  <a:schemeClr val="lt1"/>
+                </a:highlight>
+                <a:latin typeface="Cairo" pitchFamily="2" charset="-78"/>
+                <a:ea typeface="Cambria"/>
+                <a:cs typeface="Cairo" pitchFamily="2" charset="-78"/>
+              </a:rPr>
+              <a:t>%</a:t>
+            </a:r>
+          </a:p>
+          <a:p>
+            <a:pPr lvl="0">
+              <a:lnSpc>
+                <a:spcPct val="115000"/>
+              </a:lnSpc>
+            </a:pPr>
+            <a:r>
+              <a:rPr lang="en" sz="2000" b="1" dirty="0" smtClean="0">
+                <a:solidFill>
+                  <a:srgbClr val="404040"/>
                 </a:solidFill>
                 <a:highlight>
                   <a:schemeClr val="lt1"/>
@@ -9176,34 +9241,8 @@
                 <a:cs typeface="Cairo" pitchFamily="2" charset="-78"/>
                 <a:sym typeface="Cambria"/>
               </a:rPr>
-              <a:t>[Treatment Conversion Rate]</a:t>
+              <a:t>Control </a:t>
             </a:r>
-            <a:endParaRPr sz="2000" dirty="0">
-              <a:solidFill>
-                <a:srgbClr val="FF0000"/>
-              </a:solidFill>
-              <a:highlight>
-                <a:schemeClr val="lt1"/>
-              </a:highlight>
-              <a:latin typeface="Cairo" pitchFamily="2" charset="-78"/>
-              <a:ea typeface="Cambria"/>
-              <a:cs typeface="Cairo" pitchFamily="2" charset="-78"/>
-              <a:sym typeface="Cambria"/>
-            </a:endParaRPr>
-          </a:p>
-          <a:p>
-            <a:pPr marL="0" lvl="0" indent="0" algn="l" rtl="0">
-              <a:lnSpc>
-                <a:spcPct val="115000"/>
-              </a:lnSpc>
-              <a:spcBef>
-                <a:spcPts val="0"/>
-              </a:spcBef>
-              <a:spcAft>
-                <a:spcPts val="0"/>
-              </a:spcAft>
-              <a:buNone/>
-            </a:pPr>
             <a:r>
               <a:rPr lang="en" sz="2000" b="1" dirty="0">
                 <a:solidFill>
@@ -9217,7 +9256,7 @@
                 <a:cs typeface="Cairo" pitchFamily="2" charset="-78"/>
                 <a:sym typeface="Cambria"/>
               </a:rPr>
-              <a:t>Control Conversion Rate:</a:t>
+              <a:t>Conversion Rate:</a:t>
             </a:r>
             <a:r>
               <a:rPr lang="en" sz="2000" dirty="0">
@@ -9235,9 +9274,44 @@
               <a:t>​ </a:t>
             </a:r>
             <a:r>
-              <a:rPr lang="en" sz="2000" b="1" dirty="0">
+              <a:rPr lang="en-US" sz="2000" b="1" dirty="0">
                 <a:solidFill>
                   <a:srgbClr val="FF0000"/>
+                </a:solidFill>
+                <a:highlight>
+                  <a:schemeClr val="lt1"/>
+                </a:highlight>
+                <a:latin typeface="Cairo" pitchFamily="2" charset="-78"/>
+                <a:ea typeface="Cambria"/>
+                <a:cs typeface="Cairo" pitchFamily="2" charset="-78"/>
+              </a:rPr>
+              <a:t>10.53</a:t>
+            </a:r>
+            <a:r>
+              <a:rPr lang="en-US" sz="2000" b="1" dirty="0">
+                <a:solidFill>
+                  <a:srgbClr val="FF0000"/>
+                </a:solidFill>
+                <a:highlight>
+                  <a:schemeClr val="lt1"/>
+                </a:highlight>
+                <a:latin typeface="Cairo" pitchFamily="2" charset="-78"/>
+                <a:ea typeface="Cambria"/>
+                <a:cs typeface="Cairo" pitchFamily="2" charset="-78"/>
+              </a:rPr>
+              <a:t>%</a:t>
+            </a:r>
+          </a:p>
+          <a:p>
+            <a:pPr lvl="0">
+              <a:lnSpc>
+                <a:spcPct val="115000"/>
+              </a:lnSpc>
+            </a:pPr>
+            <a:r>
+              <a:rPr lang="en" sz="2000" b="1" dirty="0" smtClean="0">
+                <a:solidFill>
+                  <a:srgbClr val="404040"/>
                 </a:solidFill>
                 <a:highlight>
                   <a:schemeClr val="lt1"/>
@@ -9247,34 +9321,8 @@
                 <a:cs typeface="Cairo" pitchFamily="2" charset="-78"/>
                 <a:sym typeface="Cambria"/>
               </a:rPr>
-              <a:t>[Control Conversion Rate]</a:t>
+              <a:t>Delta </a:t>
             </a:r>
-            <a:endParaRPr sz="2000" dirty="0">
-              <a:solidFill>
-                <a:srgbClr val="FF0000"/>
-              </a:solidFill>
-              <a:highlight>
-                <a:schemeClr val="lt1"/>
-              </a:highlight>
-              <a:latin typeface="Cairo" pitchFamily="2" charset="-78"/>
-              <a:ea typeface="Cambria"/>
-              <a:cs typeface="Cairo" pitchFamily="2" charset="-78"/>
-              <a:sym typeface="Cambria"/>
-            </a:endParaRPr>
-          </a:p>
-          <a:p>
-            <a:pPr marL="0" lvl="0" indent="0" algn="l" rtl="0">
-              <a:lnSpc>
-                <a:spcPct val="108750"/>
-              </a:lnSpc>
-              <a:spcBef>
-                <a:spcPts val="0"/>
-              </a:spcBef>
-              <a:spcAft>
-                <a:spcPts val="0"/>
-              </a:spcAft>
-              <a:buNone/>
-            </a:pPr>
             <a:r>
               <a:rPr lang="en" sz="2000" b="1" dirty="0">
                 <a:solidFill>
@@ -9288,7 +9336,7 @@
                 <a:cs typeface="Cairo" pitchFamily="2" charset="-78"/>
                 <a:sym typeface="Cambria"/>
               </a:rPr>
-              <a:t>Delta in Treatment vs. Control Conversion Rate:</a:t>
+              <a:t>in Treatment vs. Control Conversion Rate:</a:t>
             </a:r>
             <a:r>
               <a:rPr lang="en" sz="2000" dirty="0">
@@ -9306,9 +9354,44 @@
               <a:t>​ </a:t>
             </a:r>
             <a:r>
-              <a:rPr lang="en" sz="2000" b="1" dirty="0">
+              <a:rPr lang="en-US" sz="2000" b="1" dirty="0">
                 <a:solidFill>
                   <a:srgbClr val="FF0000"/>
+                </a:solidFill>
+                <a:highlight>
+                  <a:schemeClr val="lt1"/>
+                </a:highlight>
+                <a:latin typeface="Cairo" pitchFamily="2" charset="-78"/>
+                <a:ea typeface="Cambria"/>
+                <a:cs typeface="Cairo" pitchFamily="2" charset="-78"/>
+              </a:rPr>
+              <a:t>5.00</a:t>
+            </a:r>
+            <a:r>
+              <a:rPr lang="en-US" sz="2000" b="1" dirty="0">
+                <a:solidFill>
+                  <a:srgbClr val="FF0000"/>
+                </a:solidFill>
+                <a:highlight>
+                  <a:schemeClr val="lt1"/>
+                </a:highlight>
+                <a:latin typeface="Cairo" pitchFamily="2" charset="-78"/>
+                <a:ea typeface="Cambria"/>
+                <a:cs typeface="Cairo" pitchFamily="2" charset="-78"/>
+              </a:rPr>
+              <a:t>%</a:t>
+            </a:r>
+          </a:p>
+          <a:p>
+            <a:pPr lvl="0">
+              <a:lnSpc>
+                <a:spcPct val="115000"/>
+              </a:lnSpc>
+            </a:pPr>
+            <a:r>
+              <a:rPr lang="en" sz="2000" b="1" dirty="0" smtClean="0">
+                <a:solidFill>
+                  <a:srgbClr val="404040"/>
                 </a:solidFill>
                 <a:highlight>
                   <a:schemeClr val="lt1"/>
@@ -9318,7 +9401,52 @@
                 <a:cs typeface="Cairo" pitchFamily="2" charset="-78"/>
                 <a:sym typeface="Cambria"/>
               </a:rPr>
-              <a:t>[Difference in Rates]</a:t>
+              <a:t>p-value</a:t>
+            </a:r>
+            <a:r>
+              <a:rPr lang="en" sz="2000" b="1" dirty="0">
+                <a:solidFill>
+                  <a:srgbClr val="404040"/>
+                </a:solidFill>
+                <a:highlight>
+                  <a:schemeClr val="lt1"/>
+                </a:highlight>
+                <a:latin typeface="Cairo" pitchFamily="2" charset="-78"/>
+                <a:ea typeface="Cambria"/>
+                <a:cs typeface="Cairo" pitchFamily="2" charset="-78"/>
+                <a:sym typeface="Cambria"/>
+              </a:rPr>
+              <a:t>:</a:t>
+            </a:r>
+            <a:r>
+              <a:rPr lang="en" sz="2000" dirty="0">
+                <a:solidFill>
+                  <a:schemeClr val="dk1"/>
+                </a:solidFill>
+                <a:highlight>
+                  <a:schemeClr val="lt1"/>
+                </a:highlight>
+                <a:latin typeface="Cairo" pitchFamily="2" charset="-78"/>
+                <a:ea typeface="Cambria"/>
+                <a:cs typeface="Cairo" pitchFamily="2" charset="-78"/>
+                <a:sym typeface="Cambria"/>
+              </a:rPr>
+              <a:t>​ </a:t>
+            </a:r>
+            <a:r>
+              <a:rPr lang="en-US" sz="2000" b="1" dirty="0">
+                <a:solidFill>
+                  <a:srgbClr val="FF0000"/>
+                </a:solidFill>
+                <a:highlight>
+                  <a:schemeClr val="lt1"/>
+                </a:highlight>
+                <a:latin typeface="Cairo" pitchFamily="2" charset="-78"/>
+                <a:ea typeface="Cambria"/>
+                <a:cs typeface="Cairo" pitchFamily="2" charset="-78"/>
+                <a:sym typeface="Cambria"/>
+              </a:rPr>
+              <a:t>0.000</a:t>
             </a:r>
             <a:endParaRPr sz="2000" b="1" dirty="0">
               <a:solidFill>
@@ -9346,77 +9474,6 @@
               </a:spcAft>
               <a:buNone/>
             </a:pPr>
-            <a:r>
-              <a:rPr lang="en" sz="2000" b="1" dirty="0">
-                <a:solidFill>
-                  <a:srgbClr val="404040"/>
-                </a:solidFill>
-                <a:highlight>
-                  <a:schemeClr val="lt1"/>
-                </a:highlight>
-                <a:latin typeface="Cairo" pitchFamily="2" charset="-78"/>
-                <a:ea typeface="Cambria"/>
-                <a:cs typeface="Cairo" pitchFamily="2" charset="-78"/>
-                <a:sym typeface="Cambria"/>
-              </a:rPr>
-              <a:t>p-value:</a:t>
-            </a:r>
-            <a:r>
-              <a:rPr lang="en" sz="2000" dirty="0">
-                <a:solidFill>
-                  <a:schemeClr val="dk1"/>
-                </a:solidFill>
-                <a:highlight>
-                  <a:schemeClr val="lt1"/>
-                </a:highlight>
-                <a:latin typeface="Cairo" pitchFamily="2" charset="-78"/>
-                <a:ea typeface="Cambria"/>
-                <a:cs typeface="Cairo" pitchFamily="2" charset="-78"/>
-                <a:sym typeface="Cambria"/>
-              </a:rPr>
-              <a:t>​ </a:t>
-            </a:r>
-            <a:r>
-              <a:rPr lang="en" sz="2000" b="1" dirty="0">
-                <a:solidFill>
-                  <a:srgbClr val="FF0000"/>
-                </a:solidFill>
-                <a:highlight>
-                  <a:schemeClr val="lt1"/>
-                </a:highlight>
-                <a:latin typeface="Cairo" pitchFamily="2" charset="-78"/>
-                <a:ea typeface="Cambria"/>
-                <a:cs typeface="Cairo" pitchFamily="2" charset="-78"/>
-                <a:sym typeface="Cambria"/>
-              </a:rPr>
-              <a:t>[p-value]</a:t>
-            </a:r>
-            <a:endParaRPr sz="2000" b="1" dirty="0">
-              <a:solidFill>
-                <a:srgbClr val="FF0000"/>
-              </a:solidFill>
-              <a:highlight>
-                <a:schemeClr val="lt1"/>
-              </a:highlight>
-              <a:latin typeface="Cairo" pitchFamily="2" charset="-78"/>
-              <a:ea typeface="Cambria"/>
-              <a:cs typeface="Cairo" pitchFamily="2" charset="-78"/>
-              <a:sym typeface="Cambria"/>
-            </a:endParaRPr>
-          </a:p>
-          <a:p>
-            <a:pPr marL="0" lvl="0" indent="0" algn="l" rtl="0">
-              <a:lnSpc>
-                <a:spcPct val="108750"/>
-              </a:lnSpc>
-              <a:spcBef>
-                <a:spcPts val="0"/>
-              </a:spcBef>
-              <a:spcAft>
-                <a:spcPts val="0"/>
-              </a:spcAft>
-              <a:buNone/>
-            </a:pPr>
             <a:endParaRPr lang="en" sz="2000" b="1" dirty="0">
               <a:solidFill>
                 <a:srgbClr val="404040"/>
@@ -9431,18 +9488,6 @@
             </a:endParaRPr>
           </a:p>
           <a:p>
-            <a:pPr marL="0" lvl="0" indent="0" algn="l" rtl="0">
-              <a:lnSpc>
-                <a:spcPct val="108750"/>
-              </a:lnSpc>
-              <a:spcBef>
-                <a:spcPts val="0"/>
-              </a:spcBef>
-              <a:spcAft>
-                <a:spcPts val="0"/>
-              </a:spcAft>
-              <a:buNone/>
-            </a:pPr>
             <a:r>
               <a:rPr lang="en" sz="2000" b="1" dirty="0" smtClean="0">
                 <a:solidFill>
@@ -9489,90 +9534,37 @@
               <a:t>​ </a:t>
             </a:r>
             <a:r>
-              <a:rPr lang="en" sz="2000" b="1" dirty="0">
+              <a:rPr lang="en-US" sz="2000" b="1" dirty="0" smtClean="0">
                 <a:solidFill>
                   <a:srgbClr val="FF0000"/>
                 </a:solidFill>
-                <a:highlight>
-                  <a:schemeClr val="lt1"/>
-                </a:highlight>
-                <a:latin typeface="Cairo" pitchFamily="2" charset="-78"/>
-                <a:ea typeface="Cambria"/>
-                <a:cs typeface="Cairo" pitchFamily="2" charset="-78"/>
-                <a:sym typeface="Cambria"/>
               </a:rPr>
-              <a:t>[Conclusion - what does the above suggest in terms of </a:t>
+              <a:t>the </a:t>
             </a:r>
             <a:r>
-              <a:rPr lang="en" sz="2000" b="1" dirty="0" smtClean="0">
+              <a:rPr lang="en-US" sz="2000" b="1" dirty="0">
                 <a:solidFill>
                   <a:srgbClr val="FF0000"/>
                 </a:solidFill>
-                <a:highlight>
-                  <a:schemeClr val="lt1"/>
-                </a:highlight>
-                <a:latin typeface="Cairo" pitchFamily="2" charset="-78"/>
-                <a:ea typeface="Cambria"/>
-                <a:cs typeface="Cairo" pitchFamily="2" charset="-78"/>
-                <a:sym typeface="Cambria"/>
               </a:rPr>
-              <a:t>treatment</a:t>
+              <a:t>new page (Treatment) has a statistically significant higher conversion rate than the old page (Control), with a p-value of 0.000, indicating that the difference is unlikely to be due to random chance. From a practical perspective, this suggests that the new page performs better in converting users, which could lead to increased user engagement or sales. Therefore, implementing the new page could be a beneficial step in improving overall conversion rates.</a:t>
             </a:r>
           </a:p>
           <a:p>
-            <a:pPr marL="0" lvl="0" indent="0" algn="l" rtl="0">
-              <a:lnSpc>
-                <a:spcPct val="108750"/>
-              </a:lnSpc>
-              <a:spcBef>
-                <a:spcPts val="0"/>
-              </a:spcBef>
-              <a:spcAft>
-                <a:spcPts val="0"/>
-              </a:spcAft>
-              <a:buNone/>
+            <a:pPr lvl="0" eaLnBrk="0" fontAlgn="base" hangingPunct="0">
+              <a:spcBef>
+                <a:spcPct val="0"/>
+              </a:spcBef>
+              <a:spcAft>
+                <a:spcPct val="0"/>
+              </a:spcAft>
+              <a:buClrTx/>
             </a:pPr>
-            <a:r>
-              <a:rPr lang="en" sz="2000" b="1" dirty="0" smtClean="0">
-                <a:solidFill>
-                  <a:srgbClr val="FF0000"/>
-                </a:solidFill>
-                <a:highlight>
-                  <a:schemeClr val="lt1"/>
-                </a:highlight>
-                <a:latin typeface="Cairo" pitchFamily="2" charset="-78"/>
-                <a:ea typeface="Cambria"/>
-                <a:cs typeface="Cairo" pitchFamily="2" charset="-78"/>
-                <a:sym typeface="Cambria"/>
-              </a:rPr>
-              <a:t> </a:t>
-            </a:r>
-            <a:r>
-              <a:rPr lang="en" sz="2000" b="1" dirty="0">
-                <a:solidFill>
-                  <a:srgbClr val="FF0000"/>
-                </a:solidFill>
-                <a:highlight>
-                  <a:schemeClr val="lt1"/>
-                </a:highlight>
-                <a:latin typeface="Cairo" pitchFamily="2" charset="-78"/>
-                <a:ea typeface="Cambria"/>
-                <a:cs typeface="Cairo" pitchFamily="2" charset="-78"/>
-                <a:sym typeface="Cambria"/>
-              </a:rPr>
-              <a:t>and control - do you have statistically significant evidence of a difference?]</a:t>
-            </a:r>
-            <a:endParaRPr sz="2000" dirty="0">
+            <a:endParaRPr lang="en-US" altLang="en-US" sz="2000" b="1" dirty="0">
               <a:solidFill>
-                <a:schemeClr val="dk1"/>
+                <a:srgbClr val="FF0000"/>
               </a:solidFill>
-              <a:highlight>
-                <a:schemeClr val="lt1"/>
-              </a:highlight>
-              <a:latin typeface="Cairo" pitchFamily="2" charset="-78"/>
-              <a:ea typeface="Cambria"/>
-              <a:cs typeface="Cairo" pitchFamily="2" charset="-78"/>
-              <a:sym typeface="Cambria"/>
+              <a:latin typeface="Arial" panose="020B0604020202020204" pitchFamily="34" charset="0"/>
             </a:endParaRPr>
           </a:p>
         </p:txBody>
@@ -9637,7 +9629,7 @@
               <a:buNone/>
             </a:pPr>
             <a:r>
-              <a:rPr lang="en" sz="3150" b="1">
+              <a:rPr lang="en" sz="3150" b="1" dirty="0">
                 <a:solidFill>
                   <a:srgbClr val="073763"/>
                 </a:solidFill>
@@ -9649,7 +9641,7 @@
               </a:rPr>
               <a:t>Country Results</a:t>
             </a:r>
-            <a:endParaRPr sz="100" b="1">
+            <a:endParaRPr sz="100" b="1" dirty="0">
               <a:solidFill>
                 <a:srgbClr val="073763"/>
               </a:solidFill>
@@ -9671,7 +9663,7 @@
         <p:spPr>
           <a:xfrm>
             <a:off x="118100" y="1020700"/>
-            <a:ext cx="9076500" cy="520112"/>
+            <a:ext cx="9076500" cy="3262401"/>
           </a:xfrm>
           <a:prstGeom prst="rect">
             <a:avLst/>
@@ -9689,20 +9681,17 @@
           </a:bodyPr>
           <a:lstStyle/>
           <a:p>
-            <a:pPr marL="0" lvl="0" indent="0" algn="l" rtl="0">
-              <a:lnSpc>
-                <a:spcPct val="108750"/>
-              </a:lnSpc>
-              <a:spcBef>
-                <a:spcPts val="0"/>
-              </a:spcBef>
-              <a:spcAft>
-                <a:spcPts val="0"/>
-              </a:spcAft>
-              <a:buNone/>
+            <a:pPr lvl="0" eaLnBrk="0" fontAlgn="base" hangingPunct="0">
+              <a:spcBef>
+                <a:spcPct val="0"/>
+              </a:spcBef>
+              <a:spcAft>
+                <a:spcPct val="0"/>
+              </a:spcAft>
+              <a:buClrTx/>
             </a:pPr>
             <a:r>
-              <a:rPr lang="en" sz="2000" b="1">
+              <a:rPr lang="en" sz="2000" b="1" dirty="0" smtClean="0">
                 <a:solidFill>
                   <a:srgbClr val="404040"/>
                 </a:solidFill>
@@ -9717,7 +9706,7 @@
               <a:t>Conclusion:</a:t>
             </a:r>
             <a:r>
-              <a:rPr lang="en" sz="2000">
+              <a:rPr lang="en" sz="2000" dirty="0" smtClean="0">
                 <a:solidFill>
                   <a:schemeClr val="dk1"/>
                 </a:solidFill>
@@ -9732,32 +9721,41 @@
               <a:t>​ </a:t>
             </a:r>
             <a:r>
-              <a:rPr lang="en" sz="2000" b="1">
+              <a:rPr lang="en-US" altLang="en-US" sz="2000" b="1" dirty="0" smtClean="0">
                 <a:solidFill>
                   <a:srgbClr val="FF0000"/>
                 </a:solidFill>
-                <a:highlight>
-                  <a:schemeClr val="lt1"/>
-                </a:highlight>
-                <a:latin typeface="Cairo" pitchFamily="2" charset="-78"/>
-                <a:ea typeface="Cambria"/>
-                <a:cs typeface="Cairo" pitchFamily="2" charset="-78"/>
-                <a:sym typeface="Cambria"/>
+                <a:latin typeface="Arial" panose="020B0604020202020204" pitchFamily="34" charset="0"/>
               </a:rPr>
-              <a:t>[Are there differences in conversion rates between countries?]</a:t>
+              <a:t>there </a:t>
             </a:r>
-            <a:endParaRPr sz="2000" b="1">
-              <a:solidFill>
-                <a:srgbClr val="FF0000"/>
-              </a:solidFill>
-              <a:highlight>
-                <a:schemeClr val="lt1"/>
-              </a:highlight>
-              <a:latin typeface="Cairo" pitchFamily="2" charset="-78"/>
-              <a:ea typeface="Cambria"/>
-              <a:cs typeface="Cairo" pitchFamily="2" charset="-78"/>
-              <a:sym typeface="Cambria"/>
-            </a:endParaRPr>
+            <a:r>
+              <a:rPr lang="en-US" altLang="en-US" sz="2000" b="1" dirty="0">
+                <a:solidFill>
+                  <a:srgbClr val="FF0000"/>
+                </a:solidFill>
+                <a:latin typeface="Arial" panose="020B0604020202020204" pitchFamily="34" charset="0"/>
+              </a:rPr>
+              <a:t>are noticeable differences in conversion rates between the </a:t>
+            </a:r>
+            <a:r>
+              <a:rPr lang="en-US" altLang="en-US" sz="2000" b="1" dirty="0" smtClean="0">
+                <a:solidFill>
+                  <a:srgbClr val="FF0000"/>
+                </a:solidFill>
+                <a:latin typeface="Arial" panose="020B0604020202020204" pitchFamily="34" charset="0"/>
+              </a:rPr>
+              <a:t>treatment </a:t>
+            </a:r>
+            <a:r>
+              <a:rPr lang="en-US" altLang="en-US" sz="2000" b="1" dirty="0">
+                <a:solidFill>
+                  <a:srgbClr val="FF0000"/>
+                </a:solidFill>
+                <a:latin typeface="Arial" panose="020B0604020202020204" pitchFamily="34" charset="0"/>
+              </a:rPr>
+              <a:t>and Control groups across countries. In the US, the Treatment group has a higher conversion rate of 15.8%, compared to the Control group’s 10.7%. The Treatment group in the UK also performs slightly better with a 14% conversion rate versus 10% for the Control group, and in Canada, the Treatment group significantly outperforms with 15% compared to 9%. These results suggest that the new page (Treatment) generally leads to better performance across all countries, though further statistical testing is needed to confirm whether these differences are statistically significant.</a:t>
+            </a:r>
           </a:p>
         </p:txBody>
       </p:sp>

</xml_diff>